<commit_message>
definicion de las entradas y salidas de los modulos
</commit_message>
<xml_diff>
--- a/Designs/Presentación1.pptx
+++ b/Designs/Presentación1.pptx
@@ -15,6 +15,7 @@
     <p:sldId id="264" r:id="rId9"/>
     <p:sldId id="265" r:id="rId10"/>
     <p:sldId id="259" r:id="rId11"/>
+    <p:sldId id="266" r:id="rId12"/>
   </p:sldIdLst>
   <p:sldSz cx="12192000" cy="6858000"/>
   <p:notesSz cx="6858000" cy="9144000"/>
@@ -3769,8 +3770,8 @@
         </p:nvSpPr>
         <p:spPr>
           <a:xfrm>
-            <a:off x="4405745" y="598519"/>
-            <a:ext cx="2556271" cy="856211"/>
+            <a:off x="3862137" y="598519"/>
+            <a:ext cx="3681663" cy="856211"/>
           </a:xfrm>
           <a:prstGeom prst="ellipse">
             <a:avLst/>
@@ -3806,7 +3807,11 @@
             <a:pPr algn="ctr"/>
             <a:r>
               <a:rPr lang="es-MX" dirty="0" smtClean="0"/>
-              <a:t>(dato, Add</a:t>
+              <a:t>(dato, </a:t>
+            </a:r>
+            <a:r>
+              <a:rPr lang="es-MX" dirty="0" err="1" smtClean="0"/>
+              <a:t>Add,W</a:t>
             </a:r>
             <a:r>
               <a:rPr lang="es-MX" dirty="0" smtClean="0"/>
@@ -3817,7 +3822,15 @@
             <a:pPr algn="ctr"/>
             <a:r>
               <a:rPr lang="es-MX" dirty="0" smtClean="0"/>
-              <a:t>&lt;salida, ciclo&gt;</a:t>
+              <a:t>&lt;salida, </a:t>
+            </a:r>
+            <a:r>
+              <a:rPr lang="es-MX" dirty="0" err="1" smtClean="0"/>
+              <a:t>ciclo,w,fin</a:t>
+            </a:r>
+            <a:r>
+              <a:rPr lang="es-MX" dirty="0" smtClean="0"/>
+              <a:t>&gt;</a:t>
             </a:r>
             <a:endParaRPr lang="es-ES" dirty="0"/>
           </a:p>
@@ -3832,9 +3845,9 @@
           <p:nvPr/>
         </p:nvCxnSpPr>
         <p:spPr>
-          <a:xfrm>
-            <a:off x="5683881" y="1454730"/>
-            <a:ext cx="12416" cy="581890"/>
+          <a:xfrm flipH="1">
+            <a:off x="5696297" y="1454730"/>
+            <a:ext cx="6672" cy="581890"/>
           </a:xfrm>
           <a:prstGeom prst="straightConnector1">
             <a:avLst/>
@@ -3992,6 +4005,13 @@
               <a:rPr lang="es-MX" dirty="0" smtClean="0"/>
               <a:t>Salida=Add</a:t>
             </a:r>
+          </a:p>
+          <a:p>
+            <a:pPr algn="ctr"/>
+            <a:r>
+              <a:rPr lang="es-MX" dirty="0" smtClean="0"/>
+              <a:t>W=0</a:t>
+            </a:r>
             <a:endParaRPr lang="es-MX" dirty="0" smtClean="0"/>
           </a:p>
           <a:p>
@@ -4134,6 +4154,13 @@
               <a:rPr lang="es-MX" dirty="0" smtClean="0"/>
               <a:t>Salida=dato</a:t>
             </a:r>
+          </a:p>
+          <a:p>
+            <a:pPr algn="ctr"/>
+            <a:r>
+              <a:rPr lang="es-MX" dirty="0" smtClean="0"/>
+              <a:t>W=1</a:t>
+            </a:r>
             <a:endParaRPr lang="es-MX" dirty="0" smtClean="0"/>
           </a:p>
           <a:p>
@@ -4351,7 +4378,13 @@
               <a:rPr lang="es-MX" dirty="0" smtClean="0"/>
               <a:t>Salida=F0H</a:t>
             </a:r>
-            <a:endParaRPr lang="es-MX" dirty="0" smtClean="0"/>
+          </a:p>
+          <a:p>
+            <a:pPr algn="ctr"/>
+            <a:r>
+              <a:rPr lang="es-MX" dirty="0" smtClean="0"/>
+              <a:t>W=0</a:t>
+            </a:r>
           </a:p>
           <a:p>
             <a:pPr algn="ctr"/>
@@ -4494,9 +4527,17 @@
           <a:p>
             <a:pPr algn="ctr"/>
             <a:r>
-              <a:rPr lang="es-MX" dirty="0"/>
+              <a:rPr lang="es-MX" dirty="0" smtClean="0"/>
               <a:t>Salida=F0H</a:t>
             </a:r>
+          </a:p>
+          <a:p>
+            <a:pPr algn="ctr"/>
+            <a:r>
+              <a:rPr lang="es-MX" dirty="0" smtClean="0"/>
+              <a:t>W=0</a:t>
+            </a:r>
+            <a:endParaRPr lang="es-MX" dirty="0"/>
           </a:p>
           <a:p>
             <a:pPr algn="ctr"/>
@@ -4544,6 +4585,1370 @@
     <p:extLst>
       <p:ext uri="{BB962C8B-B14F-4D97-AF65-F5344CB8AC3E}">
         <p14:creationId xmlns:p14="http://schemas.microsoft.com/office/powerpoint/2010/main" val="2673683463"/>
+      </p:ext>
+    </p:extLst>
+  </p:cSld>
+  <p:clrMapOvr>
+    <a:masterClrMapping/>
+  </p:clrMapOvr>
+</p:sld>
+</file>
+
+<file path=ppt/slides/slide11.xml><?xml version="1.0" encoding="utf-8"?>
+<p:sld xmlns:a="http://schemas.openxmlformats.org/drawingml/2006/main" xmlns:r="http://schemas.openxmlformats.org/officeDocument/2006/relationships" xmlns:p="http://schemas.openxmlformats.org/presentationml/2006/main">
+  <p:cSld>
+    <p:spTree>
+      <p:nvGrpSpPr>
+        <p:cNvPr id="1" name=""/>
+        <p:cNvGrpSpPr/>
+        <p:nvPr/>
+      </p:nvGrpSpPr>
+      <p:grpSpPr>
+        <a:xfrm>
+          <a:off x="0" y="0"/>
+          <a:ext cx="0" cy="0"/>
+          <a:chOff x="0" y="0"/>
+          <a:chExt cx="0" cy="0"/>
+        </a:xfrm>
+      </p:grpSpPr>
+      <p:sp>
+        <p:nvSpPr>
+          <p:cNvPr id="2" name="Rectángulo 1"/>
+          <p:cNvSpPr/>
+          <p:nvPr/>
+        </p:nvSpPr>
+        <p:spPr>
+          <a:xfrm>
+            <a:off x="1552074" y="1082842"/>
+            <a:ext cx="1455821" cy="974558"/>
+          </a:xfrm>
+          <a:prstGeom prst="rect">
+            <a:avLst/>
+          </a:prstGeom>
+        </p:spPr>
+        <p:style>
+          <a:lnRef idx="2">
+            <a:schemeClr val="accent1">
+              <a:shade val="50000"/>
+            </a:schemeClr>
+          </a:lnRef>
+          <a:fillRef idx="1">
+            <a:schemeClr val="accent1"/>
+          </a:fillRef>
+          <a:effectRef idx="0">
+            <a:schemeClr val="accent1"/>
+          </a:effectRef>
+          <a:fontRef idx="minor">
+            <a:schemeClr val="lt1"/>
+          </a:fontRef>
+        </p:style>
+        <p:txBody>
+          <a:bodyPr rtlCol="0" anchor="ctr"/>
+          <a:lstStyle/>
+          <a:p>
+            <a:pPr algn="ctr"/>
+            <a:r>
+              <a:rPr lang="es-ES" dirty="0" smtClean="0"/>
+              <a:t>inicialización</a:t>
+            </a:r>
+            <a:endParaRPr lang="es-ES" dirty="0"/>
+          </a:p>
+        </p:txBody>
+      </p:sp>
+      <p:cxnSp>
+        <p:nvCxnSpPr>
+          <p:cNvPr id="4" name="Conector recto de flecha 3"/>
+          <p:cNvCxnSpPr>
+            <a:endCxn id="2" idx="1"/>
+          </p:cNvCxnSpPr>
+          <p:nvPr/>
+        </p:nvCxnSpPr>
+        <p:spPr>
+          <a:xfrm>
+            <a:off x="770021" y="1564105"/>
+            <a:ext cx="782053" cy="6016"/>
+          </a:xfrm>
+          <a:prstGeom prst="straightConnector1">
+            <a:avLst/>
+          </a:prstGeom>
+          <a:ln>
+            <a:solidFill>
+              <a:schemeClr val="accent6">
+                <a:lumMod val="60000"/>
+                <a:lumOff val="40000"/>
+              </a:schemeClr>
+            </a:solidFill>
+            <a:tailEnd type="triangle"/>
+          </a:ln>
+        </p:spPr>
+        <p:style>
+          <a:lnRef idx="1">
+            <a:schemeClr val="accent1"/>
+          </a:lnRef>
+          <a:fillRef idx="0">
+            <a:schemeClr val="accent1"/>
+          </a:fillRef>
+          <a:effectRef idx="0">
+            <a:schemeClr val="accent1"/>
+          </a:effectRef>
+          <a:fontRef idx="minor">
+            <a:schemeClr val="tx1"/>
+          </a:fontRef>
+        </p:style>
+      </p:cxnSp>
+      <p:sp>
+        <p:nvSpPr>
+          <p:cNvPr id="7" name="Rectángulo 6"/>
+          <p:cNvSpPr/>
+          <p:nvPr/>
+        </p:nvSpPr>
+        <p:spPr>
+          <a:xfrm>
+            <a:off x="1552074" y="3693695"/>
+            <a:ext cx="1455821" cy="1130968"/>
+          </a:xfrm>
+          <a:prstGeom prst="rect">
+            <a:avLst/>
+          </a:prstGeom>
+        </p:spPr>
+        <p:style>
+          <a:lnRef idx="2">
+            <a:schemeClr val="accent1">
+              <a:shade val="50000"/>
+            </a:schemeClr>
+          </a:lnRef>
+          <a:fillRef idx="1">
+            <a:schemeClr val="accent1"/>
+          </a:fillRef>
+          <a:effectRef idx="0">
+            <a:schemeClr val="accent1"/>
+          </a:effectRef>
+          <a:fontRef idx="minor">
+            <a:schemeClr val="lt1"/>
+          </a:fontRef>
+        </p:style>
+        <p:txBody>
+          <a:bodyPr rtlCol="0" anchor="ctr"/>
+          <a:lstStyle/>
+          <a:p>
+            <a:pPr algn="ctr"/>
+            <a:r>
+              <a:rPr lang="es-ES" dirty="0" err="1" smtClean="0"/>
+              <a:t>While</a:t>
+            </a:r>
+            <a:r>
+              <a:rPr lang="es-ES" dirty="0" smtClean="0"/>
+              <a:t> true</a:t>
+            </a:r>
+            <a:endParaRPr lang="es-ES" dirty="0"/>
+          </a:p>
+        </p:txBody>
+      </p:sp>
+      <p:cxnSp>
+        <p:nvCxnSpPr>
+          <p:cNvPr id="9" name="Conector recto de flecha 8"/>
+          <p:cNvCxnSpPr>
+            <a:endCxn id="7" idx="1"/>
+          </p:cNvCxnSpPr>
+          <p:nvPr/>
+        </p:nvCxnSpPr>
+        <p:spPr>
+          <a:xfrm flipV="1">
+            <a:off x="770021" y="4259179"/>
+            <a:ext cx="782053" cy="12032"/>
+          </a:xfrm>
+          <a:prstGeom prst="straightConnector1">
+            <a:avLst/>
+          </a:prstGeom>
+          <a:ln>
+            <a:solidFill>
+              <a:schemeClr val="accent6">
+                <a:lumMod val="60000"/>
+                <a:lumOff val="40000"/>
+              </a:schemeClr>
+            </a:solidFill>
+            <a:tailEnd type="triangle"/>
+          </a:ln>
+        </p:spPr>
+        <p:style>
+          <a:lnRef idx="1">
+            <a:schemeClr val="accent1"/>
+          </a:lnRef>
+          <a:fillRef idx="0">
+            <a:schemeClr val="accent1"/>
+          </a:fillRef>
+          <a:effectRef idx="0">
+            <a:schemeClr val="accent1"/>
+          </a:effectRef>
+          <a:fontRef idx="minor">
+            <a:schemeClr val="tx1"/>
+          </a:fontRef>
+        </p:style>
+      </p:cxnSp>
+      <p:cxnSp>
+        <p:nvCxnSpPr>
+          <p:cNvPr id="12" name="Conector recto de flecha 11"/>
+          <p:cNvCxnSpPr/>
+          <p:nvPr/>
+        </p:nvCxnSpPr>
+        <p:spPr>
+          <a:xfrm flipV="1">
+            <a:off x="3019926" y="1460562"/>
+            <a:ext cx="1419727" cy="7838"/>
+          </a:xfrm>
+          <a:prstGeom prst="straightConnector1">
+            <a:avLst/>
+          </a:prstGeom>
+          <a:ln>
+            <a:solidFill>
+              <a:srgbClr val="FF0000"/>
+            </a:solidFill>
+            <a:tailEnd type="triangle"/>
+          </a:ln>
+        </p:spPr>
+        <p:style>
+          <a:lnRef idx="1">
+            <a:schemeClr val="accent1"/>
+          </a:lnRef>
+          <a:fillRef idx="0">
+            <a:schemeClr val="accent1"/>
+          </a:fillRef>
+          <a:effectRef idx="0">
+            <a:schemeClr val="accent1"/>
+          </a:effectRef>
+          <a:fontRef idx="minor">
+            <a:schemeClr val="tx1"/>
+          </a:fontRef>
+        </p:style>
+      </p:cxnSp>
+      <p:sp>
+        <p:nvSpPr>
+          <p:cNvPr id="13" name="CuadroTexto 12"/>
+          <p:cNvSpPr txBox="1"/>
+          <p:nvPr/>
+        </p:nvSpPr>
+        <p:spPr>
+          <a:xfrm>
+            <a:off x="3105911" y="1070812"/>
+            <a:ext cx="898003" cy="369332"/>
+          </a:xfrm>
+          <a:prstGeom prst="rect">
+            <a:avLst/>
+          </a:prstGeom>
+          <a:noFill/>
+        </p:spPr>
+        <p:txBody>
+          <a:bodyPr wrap="none" rtlCol="0">
+            <a:spAutoFit/>
+          </a:bodyPr>
+          <a:lstStyle/>
+          <a:p>
+            <a:r>
+              <a:rPr lang="es-ES" dirty="0" err="1" smtClean="0"/>
+              <a:t>Dir</a:t>
+            </a:r>
+            <a:r>
+              <a:rPr lang="es-ES" dirty="0" smtClean="0"/>
+              <a:t>[7:0]</a:t>
+            </a:r>
+            <a:endParaRPr lang="es-ES" dirty="0"/>
+          </a:p>
+        </p:txBody>
+      </p:sp>
+      <p:sp>
+        <p:nvSpPr>
+          <p:cNvPr id="17" name="CuadroTexto 16"/>
+          <p:cNvSpPr txBox="1"/>
+          <p:nvPr/>
+        </p:nvSpPr>
+        <p:spPr>
+          <a:xfrm>
+            <a:off x="3019926" y="1564105"/>
+            <a:ext cx="1069973" cy="369332"/>
+          </a:xfrm>
+          <a:prstGeom prst="rect">
+            <a:avLst/>
+          </a:prstGeom>
+          <a:noFill/>
+        </p:spPr>
+        <p:txBody>
+          <a:bodyPr wrap="none" rtlCol="0">
+            <a:spAutoFit/>
+          </a:bodyPr>
+          <a:lstStyle/>
+          <a:p>
+            <a:r>
+              <a:rPr lang="es-ES" dirty="0" smtClean="0"/>
+              <a:t>Dato[7:0]</a:t>
+            </a:r>
+            <a:endParaRPr lang="es-ES" dirty="0"/>
+          </a:p>
+        </p:txBody>
+      </p:sp>
+      <p:sp>
+        <p:nvSpPr>
+          <p:cNvPr id="19" name="Rectángulo 18"/>
+          <p:cNvSpPr/>
+          <p:nvPr/>
+        </p:nvSpPr>
+        <p:spPr>
+          <a:xfrm>
+            <a:off x="5533689" y="962526"/>
+            <a:ext cx="1479884" cy="1560459"/>
+          </a:xfrm>
+          <a:prstGeom prst="rect">
+            <a:avLst/>
+          </a:prstGeom>
+        </p:spPr>
+        <p:style>
+          <a:lnRef idx="2">
+            <a:schemeClr val="accent1">
+              <a:shade val="50000"/>
+            </a:schemeClr>
+          </a:lnRef>
+          <a:fillRef idx="1">
+            <a:schemeClr val="accent1"/>
+          </a:fillRef>
+          <a:effectRef idx="0">
+            <a:schemeClr val="accent1"/>
+          </a:effectRef>
+          <a:fontRef idx="minor">
+            <a:schemeClr val="lt1"/>
+          </a:fontRef>
+        </p:style>
+        <p:txBody>
+          <a:bodyPr rtlCol="0" anchor="ctr"/>
+          <a:lstStyle/>
+          <a:p>
+            <a:pPr algn="ctr"/>
+            <a:r>
+              <a:rPr lang="es-ES" dirty="0" smtClean="0"/>
+              <a:t>escritura</a:t>
+            </a:r>
+            <a:endParaRPr lang="es-ES" dirty="0"/>
+          </a:p>
+        </p:txBody>
+      </p:sp>
+      <p:sp>
+        <p:nvSpPr>
+          <p:cNvPr id="23" name="Rectángulo 22"/>
+          <p:cNvSpPr/>
+          <p:nvPr/>
+        </p:nvSpPr>
+        <p:spPr>
+          <a:xfrm>
+            <a:off x="5533689" y="3577025"/>
+            <a:ext cx="1479884" cy="1560459"/>
+          </a:xfrm>
+          <a:prstGeom prst="rect">
+            <a:avLst/>
+          </a:prstGeom>
+        </p:spPr>
+        <p:style>
+          <a:lnRef idx="2">
+            <a:schemeClr val="accent1">
+              <a:shade val="50000"/>
+            </a:schemeClr>
+          </a:lnRef>
+          <a:fillRef idx="1">
+            <a:schemeClr val="accent1"/>
+          </a:fillRef>
+          <a:effectRef idx="0">
+            <a:schemeClr val="accent1"/>
+          </a:effectRef>
+          <a:fontRef idx="minor">
+            <a:schemeClr val="lt1"/>
+          </a:fontRef>
+        </p:style>
+        <p:txBody>
+          <a:bodyPr rtlCol="0" anchor="ctr"/>
+          <a:lstStyle/>
+          <a:p>
+            <a:pPr algn="ctr"/>
+            <a:r>
+              <a:rPr lang="es-ES" dirty="0" smtClean="0"/>
+              <a:t>lectura</a:t>
+            </a:r>
+            <a:endParaRPr lang="es-ES" dirty="0"/>
+          </a:p>
+        </p:txBody>
+      </p:sp>
+      <p:sp>
+        <p:nvSpPr>
+          <p:cNvPr id="29" name="Rectángulo 28"/>
+          <p:cNvSpPr/>
+          <p:nvPr/>
+        </p:nvSpPr>
+        <p:spPr>
+          <a:xfrm>
+            <a:off x="9613231" y="1225399"/>
+            <a:ext cx="1431758" cy="3033780"/>
+          </a:xfrm>
+          <a:prstGeom prst="rect">
+            <a:avLst/>
+          </a:prstGeom>
+        </p:spPr>
+        <p:style>
+          <a:lnRef idx="2">
+            <a:schemeClr val="accent1">
+              <a:shade val="50000"/>
+            </a:schemeClr>
+          </a:lnRef>
+          <a:fillRef idx="1">
+            <a:schemeClr val="accent1"/>
+          </a:fillRef>
+          <a:effectRef idx="0">
+            <a:schemeClr val="accent1"/>
+          </a:effectRef>
+          <a:fontRef idx="minor">
+            <a:schemeClr val="lt1"/>
+          </a:fontRef>
+        </p:style>
+        <p:txBody>
+          <a:bodyPr rtlCol="0" anchor="ctr"/>
+          <a:lstStyle/>
+          <a:p>
+            <a:pPr algn="ctr"/>
+            <a:r>
+              <a:rPr lang="es-ES" dirty="0" smtClean="0"/>
+              <a:t>Activación de la salida</a:t>
+            </a:r>
+            <a:endParaRPr lang="es-ES" dirty="0"/>
+          </a:p>
+        </p:txBody>
+      </p:sp>
+      <p:sp>
+        <p:nvSpPr>
+          <p:cNvPr id="31" name="CuadroTexto 30"/>
+          <p:cNvSpPr txBox="1"/>
+          <p:nvPr/>
+        </p:nvSpPr>
+        <p:spPr>
+          <a:xfrm>
+            <a:off x="6965446" y="1373422"/>
+            <a:ext cx="898003" cy="369332"/>
+          </a:xfrm>
+          <a:prstGeom prst="rect">
+            <a:avLst/>
+          </a:prstGeom>
+          <a:noFill/>
+        </p:spPr>
+        <p:txBody>
+          <a:bodyPr wrap="none" rtlCol="0">
+            <a:spAutoFit/>
+          </a:bodyPr>
+          <a:lstStyle/>
+          <a:p>
+            <a:r>
+              <a:rPr lang="es-ES" dirty="0" err="1" smtClean="0"/>
+              <a:t>Dir</a:t>
+            </a:r>
+            <a:r>
+              <a:rPr lang="es-ES" dirty="0" smtClean="0"/>
+              <a:t>[7:0]</a:t>
+            </a:r>
+            <a:endParaRPr lang="es-ES" dirty="0"/>
+          </a:p>
+        </p:txBody>
+      </p:sp>
+      <p:cxnSp>
+        <p:nvCxnSpPr>
+          <p:cNvPr id="32" name="Conector recto de flecha 31"/>
+          <p:cNvCxnSpPr/>
+          <p:nvPr/>
+        </p:nvCxnSpPr>
+        <p:spPr>
+          <a:xfrm flipV="1">
+            <a:off x="6965446" y="2017108"/>
+            <a:ext cx="1167901" cy="4198"/>
+          </a:xfrm>
+          <a:prstGeom prst="straightConnector1">
+            <a:avLst/>
+          </a:prstGeom>
+          <a:ln>
+            <a:solidFill>
+              <a:srgbClr val="FF0000"/>
+            </a:solidFill>
+            <a:tailEnd type="triangle"/>
+          </a:ln>
+        </p:spPr>
+        <p:style>
+          <a:lnRef idx="1">
+            <a:schemeClr val="accent1"/>
+          </a:lnRef>
+          <a:fillRef idx="0">
+            <a:schemeClr val="accent1"/>
+          </a:fillRef>
+          <a:effectRef idx="0">
+            <a:schemeClr val="accent1"/>
+          </a:effectRef>
+          <a:fontRef idx="minor">
+            <a:schemeClr val="tx1"/>
+          </a:fontRef>
+        </p:style>
+      </p:cxnSp>
+      <p:sp>
+        <p:nvSpPr>
+          <p:cNvPr id="33" name="CuadroTexto 32"/>
+          <p:cNvSpPr txBox="1"/>
+          <p:nvPr/>
+        </p:nvSpPr>
+        <p:spPr>
+          <a:xfrm>
+            <a:off x="6965446" y="1653066"/>
+            <a:ext cx="1069973" cy="369332"/>
+          </a:xfrm>
+          <a:prstGeom prst="rect">
+            <a:avLst/>
+          </a:prstGeom>
+          <a:noFill/>
+        </p:spPr>
+        <p:txBody>
+          <a:bodyPr wrap="none" rtlCol="0">
+            <a:spAutoFit/>
+          </a:bodyPr>
+          <a:lstStyle/>
+          <a:p>
+            <a:r>
+              <a:rPr lang="es-ES" dirty="0" smtClean="0"/>
+              <a:t>Dato[7:0]</a:t>
+            </a:r>
+            <a:endParaRPr lang="es-ES" dirty="0"/>
+          </a:p>
+        </p:txBody>
+      </p:sp>
+      <p:sp>
+        <p:nvSpPr>
+          <p:cNvPr id="34" name="CuadroTexto 33"/>
+          <p:cNvSpPr txBox="1"/>
+          <p:nvPr/>
+        </p:nvSpPr>
+        <p:spPr>
+          <a:xfrm>
+            <a:off x="3038812" y="1909375"/>
+            <a:ext cx="757989" cy="369332"/>
+          </a:xfrm>
+          <a:prstGeom prst="rect">
+            <a:avLst/>
+          </a:prstGeom>
+          <a:noFill/>
+        </p:spPr>
+        <p:txBody>
+          <a:bodyPr wrap="square" rtlCol="0">
+            <a:spAutoFit/>
+          </a:bodyPr>
+          <a:lstStyle/>
+          <a:p>
+            <a:r>
+              <a:rPr lang="es-ES" dirty="0" smtClean="0"/>
+              <a:t>W=0</a:t>
+            </a:r>
+            <a:endParaRPr lang="es-ES" dirty="0"/>
+          </a:p>
+        </p:txBody>
+      </p:sp>
+      <p:cxnSp>
+        <p:nvCxnSpPr>
+          <p:cNvPr id="38" name="Conector angular 37"/>
+          <p:cNvCxnSpPr>
+            <a:stCxn id="2" idx="0"/>
+          </p:cNvCxnSpPr>
+          <p:nvPr/>
+        </p:nvCxnSpPr>
+        <p:spPr>
+          <a:xfrm rot="5400000" flipH="1" flipV="1">
+            <a:off x="3726782" y="-1109913"/>
+            <a:ext cx="745958" cy="3639552"/>
+          </a:xfrm>
+          <a:prstGeom prst="bentConnector2">
+            <a:avLst/>
+          </a:prstGeom>
+          <a:ln>
+            <a:solidFill>
+              <a:schemeClr val="accent6">
+                <a:lumMod val="60000"/>
+                <a:lumOff val="40000"/>
+              </a:schemeClr>
+            </a:solidFill>
+            <a:tailEnd type="triangle"/>
+          </a:ln>
+        </p:spPr>
+        <p:style>
+          <a:lnRef idx="1">
+            <a:schemeClr val="accent1"/>
+          </a:lnRef>
+          <a:fillRef idx="0">
+            <a:schemeClr val="accent1"/>
+          </a:fillRef>
+          <a:effectRef idx="0">
+            <a:schemeClr val="accent1"/>
+          </a:effectRef>
+          <a:fontRef idx="minor">
+            <a:schemeClr val="tx1"/>
+          </a:fontRef>
+        </p:style>
+      </p:cxnSp>
+      <p:cxnSp>
+        <p:nvCxnSpPr>
+          <p:cNvPr id="40" name="Conector recto de flecha 39"/>
+          <p:cNvCxnSpPr/>
+          <p:nvPr/>
+        </p:nvCxnSpPr>
+        <p:spPr>
+          <a:xfrm>
+            <a:off x="5931568" y="348916"/>
+            <a:ext cx="12032" cy="613610"/>
+          </a:xfrm>
+          <a:prstGeom prst="straightConnector1">
+            <a:avLst/>
+          </a:prstGeom>
+          <a:ln>
+            <a:solidFill>
+              <a:schemeClr val="accent6">
+                <a:lumMod val="60000"/>
+                <a:lumOff val="40000"/>
+              </a:schemeClr>
+            </a:solidFill>
+            <a:tailEnd type="triangle"/>
+          </a:ln>
+        </p:spPr>
+        <p:style>
+          <a:lnRef idx="1">
+            <a:schemeClr val="accent1"/>
+          </a:lnRef>
+          <a:fillRef idx="0">
+            <a:schemeClr val="accent1"/>
+          </a:fillRef>
+          <a:effectRef idx="0">
+            <a:schemeClr val="accent1"/>
+          </a:effectRef>
+          <a:fontRef idx="minor">
+            <a:schemeClr val="tx1"/>
+          </a:fontRef>
+        </p:style>
+      </p:cxnSp>
+      <p:sp>
+        <p:nvSpPr>
+          <p:cNvPr id="41" name="Rectángulo redondeado 40"/>
+          <p:cNvSpPr/>
+          <p:nvPr/>
+        </p:nvSpPr>
+        <p:spPr>
+          <a:xfrm>
+            <a:off x="4439653" y="962525"/>
+            <a:ext cx="782052" cy="1560459"/>
+          </a:xfrm>
+          <a:prstGeom prst="roundRect">
+            <a:avLst/>
+          </a:prstGeom>
+        </p:spPr>
+        <p:style>
+          <a:lnRef idx="2">
+            <a:schemeClr val="accent1">
+              <a:shade val="50000"/>
+            </a:schemeClr>
+          </a:lnRef>
+          <a:fillRef idx="1">
+            <a:schemeClr val="accent1"/>
+          </a:fillRef>
+          <a:effectRef idx="0">
+            <a:schemeClr val="accent1"/>
+          </a:effectRef>
+          <a:fontRef idx="minor">
+            <a:schemeClr val="lt1"/>
+          </a:fontRef>
+        </p:style>
+        <p:txBody>
+          <a:bodyPr rtlCol="0" anchor="ctr"/>
+          <a:lstStyle/>
+          <a:p>
+            <a:pPr algn="ctr"/>
+            <a:r>
+              <a:rPr lang="es-ES" dirty="0" err="1" smtClean="0"/>
+              <a:t>mux</a:t>
+            </a:r>
+            <a:endParaRPr lang="es-ES" dirty="0"/>
+          </a:p>
+        </p:txBody>
+      </p:sp>
+      <p:cxnSp>
+        <p:nvCxnSpPr>
+          <p:cNvPr id="45" name="Conector angular 44"/>
+          <p:cNvCxnSpPr>
+            <a:stCxn id="7" idx="3"/>
+            <a:endCxn id="41" idx="1"/>
+          </p:cNvCxnSpPr>
+          <p:nvPr/>
+        </p:nvCxnSpPr>
+        <p:spPr>
+          <a:xfrm flipV="1">
+            <a:off x="3007895" y="1742755"/>
+            <a:ext cx="1431758" cy="2516424"/>
+          </a:xfrm>
+          <a:prstGeom prst="bentConnector3">
+            <a:avLst/>
+          </a:prstGeom>
+          <a:ln>
+            <a:solidFill>
+              <a:srgbClr val="FF0000"/>
+            </a:solidFill>
+            <a:tailEnd type="triangle"/>
+          </a:ln>
+        </p:spPr>
+        <p:style>
+          <a:lnRef idx="1">
+            <a:schemeClr val="accent1"/>
+          </a:lnRef>
+          <a:fillRef idx="0">
+            <a:schemeClr val="accent1"/>
+          </a:fillRef>
+          <a:effectRef idx="0">
+            <a:schemeClr val="accent1"/>
+          </a:effectRef>
+          <a:fontRef idx="minor">
+            <a:schemeClr val="tx1"/>
+          </a:fontRef>
+        </p:style>
+      </p:cxnSp>
+      <p:cxnSp>
+        <p:nvCxnSpPr>
+          <p:cNvPr id="47" name="Conector recto de flecha 46"/>
+          <p:cNvCxnSpPr>
+            <a:stCxn id="41" idx="3"/>
+            <a:endCxn id="19" idx="1"/>
+          </p:cNvCxnSpPr>
+          <p:nvPr/>
+        </p:nvCxnSpPr>
+        <p:spPr>
+          <a:xfrm>
+            <a:off x="5221705" y="1742755"/>
+            <a:ext cx="311984" cy="1"/>
+          </a:xfrm>
+          <a:prstGeom prst="straightConnector1">
+            <a:avLst/>
+          </a:prstGeom>
+          <a:ln>
+            <a:solidFill>
+              <a:srgbClr val="FF0000"/>
+            </a:solidFill>
+            <a:tailEnd type="triangle"/>
+          </a:ln>
+        </p:spPr>
+        <p:style>
+          <a:lnRef idx="1">
+            <a:schemeClr val="accent1"/>
+          </a:lnRef>
+          <a:fillRef idx="0">
+            <a:schemeClr val="accent1"/>
+          </a:fillRef>
+          <a:effectRef idx="0">
+            <a:schemeClr val="accent1"/>
+          </a:effectRef>
+          <a:fontRef idx="minor">
+            <a:schemeClr val="tx1"/>
+          </a:fontRef>
+        </p:style>
+      </p:cxnSp>
+      <p:cxnSp>
+        <p:nvCxnSpPr>
+          <p:cNvPr id="50" name="Conector angular 49"/>
+          <p:cNvCxnSpPr/>
+          <p:nvPr/>
+        </p:nvCxnSpPr>
+        <p:spPr>
+          <a:xfrm flipV="1">
+            <a:off x="1161047" y="962525"/>
+            <a:ext cx="3669632" cy="601580"/>
+          </a:xfrm>
+          <a:prstGeom prst="bentConnector4">
+            <a:avLst>
+              <a:gd name="adj1" fmla="val 410"/>
+              <a:gd name="adj2" fmla="val 138000"/>
+            </a:avLst>
+          </a:prstGeom>
+          <a:ln>
+            <a:solidFill>
+              <a:schemeClr val="accent6">
+                <a:lumMod val="60000"/>
+                <a:lumOff val="40000"/>
+              </a:schemeClr>
+            </a:solidFill>
+            <a:tailEnd type="triangle"/>
+          </a:ln>
+        </p:spPr>
+        <p:style>
+          <a:lnRef idx="1">
+            <a:schemeClr val="accent1"/>
+          </a:lnRef>
+          <a:fillRef idx="0">
+            <a:schemeClr val="accent1"/>
+          </a:fillRef>
+          <a:effectRef idx="0">
+            <a:schemeClr val="accent1"/>
+          </a:effectRef>
+          <a:fontRef idx="minor">
+            <a:schemeClr val="tx1"/>
+          </a:fontRef>
+        </p:style>
+      </p:cxnSp>
+      <p:cxnSp>
+        <p:nvCxnSpPr>
+          <p:cNvPr id="53" name="Conector angular 52"/>
+          <p:cNvCxnSpPr>
+            <a:endCxn id="41" idx="0"/>
+          </p:cNvCxnSpPr>
+          <p:nvPr/>
+        </p:nvCxnSpPr>
+        <p:spPr>
+          <a:xfrm flipV="1">
+            <a:off x="914400" y="962525"/>
+            <a:ext cx="3916279" cy="3308686"/>
+          </a:xfrm>
+          <a:prstGeom prst="bentConnector4">
+            <a:avLst>
+              <a:gd name="adj1" fmla="val 1997"/>
+              <a:gd name="adj2" fmla="val 113818"/>
+            </a:avLst>
+          </a:prstGeom>
+          <a:ln>
+            <a:solidFill>
+              <a:schemeClr val="accent6">
+                <a:lumMod val="60000"/>
+                <a:lumOff val="40000"/>
+              </a:schemeClr>
+            </a:solidFill>
+            <a:tailEnd type="triangle"/>
+          </a:ln>
+        </p:spPr>
+        <p:style>
+          <a:lnRef idx="1">
+            <a:schemeClr val="accent1"/>
+          </a:lnRef>
+          <a:fillRef idx="0">
+            <a:schemeClr val="accent1"/>
+          </a:fillRef>
+          <a:effectRef idx="0">
+            <a:schemeClr val="accent1"/>
+          </a:effectRef>
+          <a:fontRef idx="minor">
+            <a:schemeClr val="tx1"/>
+          </a:fontRef>
+        </p:style>
+      </p:cxnSp>
+      <p:cxnSp>
+        <p:nvCxnSpPr>
+          <p:cNvPr id="60" name="Conector angular 59"/>
+          <p:cNvCxnSpPr/>
+          <p:nvPr/>
+        </p:nvCxnSpPr>
+        <p:spPr>
+          <a:xfrm flipV="1">
+            <a:off x="3007895" y="3000967"/>
+            <a:ext cx="3265736" cy="981486"/>
+          </a:xfrm>
+          <a:prstGeom prst="bentConnector3">
+            <a:avLst/>
+          </a:prstGeom>
+          <a:ln>
+            <a:solidFill>
+              <a:schemeClr val="accent6"/>
+            </a:solidFill>
+          </a:ln>
+        </p:spPr>
+        <p:style>
+          <a:lnRef idx="1">
+            <a:schemeClr val="accent1"/>
+          </a:lnRef>
+          <a:fillRef idx="0">
+            <a:schemeClr val="accent1"/>
+          </a:fillRef>
+          <a:effectRef idx="0">
+            <a:schemeClr val="accent1"/>
+          </a:effectRef>
+          <a:fontRef idx="minor">
+            <a:schemeClr val="tx1"/>
+          </a:fontRef>
+        </p:style>
+      </p:cxnSp>
+      <p:cxnSp>
+        <p:nvCxnSpPr>
+          <p:cNvPr id="62" name="Conector angular 61"/>
+          <p:cNvCxnSpPr>
+            <a:stCxn id="19" idx="2"/>
+            <a:endCxn id="23" idx="0"/>
+          </p:cNvCxnSpPr>
+          <p:nvPr/>
+        </p:nvCxnSpPr>
+        <p:spPr>
+          <a:xfrm rot="5400000">
+            <a:off x="5746611" y="3050005"/>
+            <a:ext cx="1054040" cy="12700"/>
+          </a:xfrm>
+          <a:prstGeom prst="bentConnector3">
+            <a:avLst/>
+          </a:prstGeom>
+          <a:ln>
+            <a:solidFill>
+              <a:schemeClr val="accent6"/>
+            </a:solidFill>
+            <a:headEnd type="triangle"/>
+            <a:tailEnd type="triangle"/>
+          </a:ln>
+        </p:spPr>
+        <p:style>
+          <a:lnRef idx="1">
+            <a:schemeClr val="accent1"/>
+          </a:lnRef>
+          <a:fillRef idx="0">
+            <a:schemeClr val="accent1"/>
+          </a:fillRef>
+          <a:effectRef idx="0">
+            <a:schemeClr val="accent1"/>
+          </a:effectRef>
+          <a:fontRef idx="minor">
+            <a:schemeClr val="tx1"/>
+          </a:fontRef>
+        </p:style>
+      </p:cxnSp>
+      <p:cxnSp>
+        <p:nvCxnSpPr>
+          <p:cNvPr id="64" name="Conector recto de flecha 63"/>
+          <p:cNvCxnSpPr/>
+          <p:nvPr/>
+        </p:nvCxnSpPr>
+        <p:spPr>
+          <a:xfrm>
+            <a:off x="3723774" y="4259179"/>
+            <a:ext cx="1809915" cy="0"/>
+          </a:xfrm>
+          <a:prstGeom prst="straightConnector1">
+            <a:avLst/>
+          </a:prstGeom>
+          <a:ln>
+            <a:solidFill>
+              <a:srgbClr val="FF0000"/>
+            </a:solidFill>
+            <a:tailEnd type="triangle"/>
+          </a:ln>
+        </p:spPr>
+        <p:style>
+          <a:lnRef idx="1">
+            <a:schemeClr val="accent1"/>
+          </a:lnRef>
+          <a:fillRef idx="0">
+            <a:schemeClr val="accent1"/>
+          </a:fillRef>
+          <a:effectRef idx="0">
+            <a:schemeClr val="accent1"/>
+          </a:effectRef>
+          <a:fontRef idx="minor">
+            <a:schemeClr val="tx1"/>
+          </a:fontRef>
+        </p:style>
+      </p:cxnSp>
+      <p:sp>
+        <p:nvSpPr>
+          <p:cNvPr id="65" name="CuadroTexto 64"/>
+          <p:cNvSpPr txBox="1"/>
+          <p:nvPr/>
+        </p:nvSpPr>
+        <p:spPr>
+          <a:xfrm>
+            <a:off x="3047734" y="3566818"/>
+            <a:ext cx="930063" cy="369332"/>
+          </a:xfrm>
+          <a:prstGeom prst="rect">
+            <a:avLst/>
+          </a:prstGeom>
+          <a:noFill/>
+        </p:spPr>
+        <p:txBody>
+          <a:bodyPr wrap="none" rtlCol="0">
+            <a:spAutoFit/>
+          </a:bodyPr>
+          <a:lstStyle/>
+          <a:p>
+            <a:r>
+              <a:rPr lang="es-ES" dirty="0" err="1" smtClean="0"/>
+              <a:t>Act</a:t>
+            </a:r>
+            <a:r>
+              <a:rPr lang="es-ES" dirty="0" smtClean="0"/>
+              <a:t>[1:0]</a:t>
+            </a:r>
+            <a:endParaRPr lang="es-ES" dirty="0"/>
+          </a:p>
+        </p:txBody>
+      </p:sp>
+      <p:sp>
+        <p:nvSpPr>
+          <p:cNvPr id="66" name="Rectángulo redondeado 65"/>
+          <p:cNvSpPr/>
+          <p:nvPr/>
+        </p:nvSpPr>
+        <p:spPr>
+          <a:xfrm>
+            <a:off x="8133347" y="1440144"/>
+            <a:ext cx="661737" cy="2542309"/>
+          </a:xfrm>
+          <a:prstGeom prst="roundRect">
+            <a:avLst/>
+          </a:prstGeom>
+        </p:spPr>
+        <p:style>
+          <a:lnRef idx="2">
+            <a:schemeClr val="accent1">
+              <a:shade val="50000"/>
+            </a:schemeClr>
+          </a:lnRef>
+          <a:fillRef idx="1">
+            <a:schemeClr val="accent1"/>
+          </a:fillRef>
+          <a:effectRef idx="0">
+            <a:schemeClr val="accent1"/>
+          </a:effectRef>
+          <a:fontRef idx="minor">
+            <a:schemeClr val="lt1"/>
+          </a:fontRef>
+        </p:style>
+        <p:txBody>
+          <a:bodyPr rtlCol="0" anchor="ctr"/>
+          <a:lstStyle/>
+          <a:p>
+            <a:pPr algn="ctr"/>
+            <a:r>
+              <a:rPr lang="es-ES" dirty="0" err="1" smtClean="0"/>
+              <a:t>mux</a:t>
+            </a:r>
+            <a:endParaRPr lang="es-ES" dirty="0"/>
+          </a:p>
+        </p:txBody>
+      </p:sp>
+      <p:sp>
+        <p:nvSpPr>
+          <p:cNvPr id="69" name="CuadroTexto 68"/>
+          <p:cNvSpPr txBox="1"/>
+          <p:nvPr/>
+        </p:nvSpPr>
+        <p:spPr>
+          <a:xfrm>
+            <a:off x="6960042" y="1099068"/>
+            <a:ext cx="470000" cy="369332"/>
+          </a:xfrm>
+          <a:prstGeom prst="rect">
+            <a:avLst/>
+          </a:prstGeom>
+          <a:noFill/>
+        </p:spPr>
+        <p:txBody>
+          <a:bodyPr wrap="none" rtlCol="0">
+            <a:spAutoFit/>
+          </a:bodyPr>
+          <a:lstStyle/>
+          <a:p>
+            <a:r>
+              <a:rPr lang="es-ES" dirty="0" err="1" smtClean="0"/>
+              <a:t>act</a:t>
+            </a:r>
+            <a:endParaRPr lang="es-ES" dirty="0"/>
+          </a:p>
+        </p:txBody>
+      </p:sp>
+      <p:cxnSp>
+        <p:nvCxnSpPr>
+          <p:cNvPr id="72" name="Conector angular 71"/>
+          <p:cNvCxnSpPr>
+            <a:stCxn id="23" idx="3"/>
+          </p:cNvCxnSpPr>
+          <p:nvPr/>
+        </p:nvCxnSpPr>
+        <p:spPr>
+          <a:xfrm flipV="1">
+            <a:off x="7013573" y="3260558"/>
+            <a:ext cx="1119774" cy="1096697"/>
+          </a:xfrm>
+          <a:prstGeom prst="bentConnector3">
+            <a:avLst/>
+          </a:prstGeom>
+          <a:ln>
+            <a:solidFill>
+              <a:srgbClr val="FF0000"/>
+            </a:solidFill>
+            <a:tailEnd type="triangle"/>
+          </a:ln>
+        </p:spPr>
+        <p:style>
+          <a:lnRef idx="1">
+            <a:schemeClr val="accent1"/>
+          </a:lnRef>
+          <a:fillRef idx="0">
+            <a:schemeClr val="accent1"/>
+          </a:fillRef>
+          <a:effectRef idx="0">
+            <a:schemeClr val="accent1"/>
+          </a:effectRef>
+          <a:fontRef idx="minor">
+            <a:schemeClr val="tx1"/>
+          </a:fontRef>
+        </p:style>
+      </p:cxnSp>
+      <p:cxnSp>
+        <p:nvCxnSpPr>
+          <p:cNvPr id="74" name="Conector recto de flecha 73"/>
+          <p:cNvCxnSpPr>
+            <a:stCxn id="66" idx="3"/>
+          </p:cNvCxnSpPr>
+          <p:nvPr/>
+        </p:nvCxnSpPr>
+        <p:spPr>
+          <a:xfrm flipV="1">
+            <a:off x="8795084" y="2711298"/>
+            <a:ext cx="830721" cy="1"/>
+          </a:xfrm>
+          <a:prstGeom prst="straightConnector1">
+            <a:avLst/>
+          </a:prstGeom>
+          <a:ln>
+            <a:solidFill>
+              <a:srgbClr val="FF0000"/>
+            </a:solidFill>
+            <a:tailEnd type="triangle"/>
+          </a:ln>
+        </p:spPr>
+        <p:style>
+          <a:lnRef idx="1">
+            <a:schemeClr val="accent1"/>
+          </a:lnRef>
+          <a:fillRef idx="0">
+            <a:schemeClr val="accent1"/>
+          </a:fillRef>
+          <a:effectRef idx="0">
+            <a:schemeClr val="accent1"/>
+          </a:effectRef>
+          <a:fontRef idx="minor">
+            <a:schemeClr val="tx1"/>
+          </a:fontRef>
+        </p:style>
+      </p:cxnSp>
+      <p:cxnSp>
+        <p:nvCxnSpPr>
+          <p:cNvPr id="76" name="Conector angular 75"/>
+          <p:cNvCxnSpPr>
+            <a:endCxn id="29" idx="0"/>
+          </p:cNvCxnSpPr>
+          <p:nvPr/>
+        </p:nvCxnSpPr>
+        <p:spPr>
+          <a:xfrm flipV="1">
+            <a:off x="8795084" y="1225399"/>
+            <a:ext cx="1534026" cy="832001"/>
+          </a:xfrm>
+          <a:prstGeom prst="bentConnector4">
+            <a:avLst>
+              <a:gd name="adj1" fmla="val 26667"/>
+              <a:gd name="adj2" fmla="val 127476"/>
+            </a:avLst>
+          </a:prstGeom>
+          <a:ln>
+            <a:solidFill>
+              <a:schemeClr val="accent6">
+                <a:lumMod val="60000"/>
+                <a:lumOff val="40000"/>
+              </a:schemeClr>
+            </a:solidFill>
+            <a:tailEnd type="triangle"/>
+          </a:ln>
+        </p:spPr>
+        <p:style>
+          <a:lnRef idx="1">
+            <a:schemeClr val="accent1"/>
+          </a:lnRef>
+          <a:fillRef idx="0">
+            <a:schemeClr val="accent1"/>
+          </a:fillRef>
+          <a:effectRef idx="0">
+            <a:schemeClr val="accent1"/>
+          </a:effectRef>
+          <a:fontRef idx="minor">
+            <a:schemeClr val="tx1"/>
+          </a:fontRef>
+        </p:style>
+      </p:cxnSp>
+      <p:sp>
+        <p:nvSpPr>
+          <p:cNvPr id="77" name="Flecha derecha 76"/>
+          <p:cNvSpPr/>
+          <p:nvPr/>
+        </p:nvSpPr>
+        <p:spPr>
+          <a:xfrm>
+            <a:off x="11044989" y="2522984"/>
+            <a:ext cx="950495" cy="477983"/>
+          </a:xfrm>
+          <a:prstGeom prst="rightArrow">
+            <a:avLst/>
+          </a:prstGeom>
+        </p:spPr>
+        <p:style>
+          <a:lnRef idx="2">
+            <a:schemeClr val="accent1">
+              <a:shade val="50000"/>
+            </a:schemeClr>
+          </a:lnRef>
+          <a:fillRef idx="1">
+            <a:schemeClr val="accent1"/>
+          </a:fillRef>
+          <a:effectRef idx="0">
+            <a:schemeClr val="accent1"/>
+          </a:effectRef>
+          <a:fontRef idx="minor">
+            <a:schemeClr val="lt1"/>
+          </a:fontRef>
+        </p:style>
+        <p:txBody>
+          <a:bodyPr rtlCol="0" anchor="ctr"/>
+          <a:lstStyle/>
+          <a:p>
+            <a:pPr algn="ctr"/>
+            <a:endParaRPr lang="es-ES"/>
+          </a:p>
+        </p:txBody>
+      </p:sp>
+      <p:sp>
+        <p:nvSpPr>
+          <p:cNvPr id="78" name="Rectángulo 77"/>
+          <p:cNvSpPr/>
+          <p:nvPr/>
+        </p:nvSpPr>
+        <p:spPr>
+          <a:xfrm>
+            <a:off x="9587664" y="4896852"/>
+            <a:ext cx="1482892" cy="589548"/>
+          </a:xfrm>
+          <a:prstGeom prst="rect">
+            <a:avLst/>
+          </a:prstGeom>
+        </p:spPr>
+        <p:style>
+          <a:lnRef idx="2">
+            <a:schemeClr val="accent1">
+              <a:shade val="50000"/>
+            </a:schemeClr>
+          </a:lnRef>
+          <a:fillRef idx="1">
+            <a:schemeClr val="accent1"/>
+          </a:fillRef>
+          <a:effectRef idx="0">
+            <a:schemeClr val="accent1"/>
+          </a:effectRef>
+          <a:fontRef idx="minor">
+            <a:schemeClr val="lt1"/>
+          </a:fontRef>
+        </p:style>
+        <p:txBody>
+          <a:bodyPr rtlCol="0" anchor="ctr"/>
+          <a:lstStyle/>
+          <a:p>
+            <a:pPr algn="ctr"/>
+            <a:r>
+              <a:rPr lang="es-ES" dirty="0" smtClean="0"/>
+              <a:t>cronometro</a:t>
+            </a:r>
+            <a:endParaRPr lang="es-ES" dirty="0"/>
+          </a:p>
+        </p:txBody>
+      </p:sp>
+      <p:cxnSp>
+        <p:nvCxnSpPr>
+          <p:cNvPr id="80" name="Conector recto de flecha 79"/>
+          <p:cNvCxnSpPr>
+            <a:stCxn id="78" idx="0"/>
+            <a:endCxn id="29" idx="2"/>
+          </p:cNvCxnSpPr>
+          <p:nvPr/>
+        </p:nvCxnSpPr>
+        <p:spPr>
+          <a:xfrm flipV="1">
+            <a:off x="10329110" y="4259179"/>
+            <a:ext cx="0" cy="637673"/>
+          </a:xfrm>
+          <a:prstGeom prst="straightConnector1">
+            <a:avLst/>
+          </a:prstGeom>
+          <a:ln>
+            <a:solidFill>
+              <a:srgbClr val="FF0000"/>
+            </a:solidFill>
+            <a:tailEnd type="triangle"/>
+          </a:ln>
+        </p:spPr>
+        <p:style>
+          <a:lnRef idx="1">
+            <a:schemeClr val="accent1"/>
+          </a:lnRef>
+          <a:fillRef idx="0">
+            <a:schemeClr val="accent1"/>
+          </a:fillRef>
+          <a:effectRef idx="0">
+            <a:schemeClr val="accent1"/>
+          </a:effectRef>
+          <a:fontRef idx="minor">
+            <a:schemeClr val="tx1"/>
+          </a:fontRef>
+        </p:style>
+      </p:cxnSp>
+      <p:sp>
+        <p:nvSpPr>
+          <p:cNvPr id="83" name="CuadroTexto 82"/>
+          <p:cNvSpPr txBox="1"/>
+          <p:nvPr/>
+        </p:nvSpPr>
+        <p:spPr>
+          <a:xfrm>
+            <a:off x="649705" y="5486400"/>
+            <a:ext cx="2456206" cy="646331"/>
+          </a:xfrm>
+          <a:prstGeom prst="rect">
+            <a:avLst/>
+          </a:prstGeom>
+          <a:noFill/>
+        </p:spPr>
+        <p:txBody>
+          <a:bodyPr wrap="square" rtlCol="0">
+            <a:spAutoFit/>
+          </a:bodyPr>
+          <a:lstStyle/>
+          <a:p>
+            <a:r>
+              <a:rPr lang="es-ES" dirty="0" smtClean="0">
+                <a:solidFill>
+                  <a:srgbClr val="FF0000"/>
+                </a:solidFill>
+              </a:rPr>
+              <a:t>Datos</a:t>
+            </a:r>
+          </a:p>
+          <a:p>
+            <a:r>
+              <a:rPr lang="es-ES" dirty="0" smtClean="0">
+                <a:solidFill>
+                  <a:schemeClr val="accent6"/>
+                </a:solidFill>
+              </a:rPr>
+              <a:t>Control</a:t>
+            </a:r>
+            <a:endParaRPr lang="es-ES" dirty="0">
+              <a:solidFill>
+                <a:schemeClr val="accent6"/>
+              </a:solidFill>
+            </a:endParaRPr>
+          </a:p>
+        </p:txBody>
+      </p:sp>
+    </p:spTree>
+    <p:extLst>
+      <p:ext uri="{BB962C8B-B14F-4D97-AF65-F5344CB8AC3E}">
+        <p14:creationId xmlns:p14="http://schemas.microsoft.com/office/powerpoint/2010/main" val="1852148862"/>
       </p:ext>
     </p:extLst>
   </p:cSld>
@@ -4578,8 +5983,8 @@
         </p:nvSpPr>
         <p:spPr>
           <a:xfrm>
-            <a:off x="4172989" y="615142"/>
-            <a:ext cx="2061556" cy="814647"/>
+            <a:off x="3408218" y="336884"/>
+            <a:ext cx="3654319" cy="1092905"/>
           </a:xfrm>
           <a:prstGeom prst="ellipse">
             <a:avLst/>
@@ -4608,7 +6013,38 @@
             <a:pPr algn="ctr"/>
             <a:r>
               <a:rPr lang="es-MX" dirty="0" smtClean="0"/>
-              <a:t>inicialización</a:t>
+              <a:t>Inicialización</a:t>
+            </a:r>
+          </a:p>
+          <a:p>
+            <a:pPr algn="ctr"/>
+            <a:r>
+              <a:rPr lang="es-MX" dirty="0" smtClean="0"/>
+              <a:t>(se</a:t>
+            </a:r>
+            <a:r>
+              <a:rPr lang="es-ES" dirty="0" err="1" smtClean="0"/>
+              <a:t>ñal,fin</a:t>
+            </a:r>
+            <a:r>
+              <a:rPr lang="en-US" dirty="0"/>
+              <a:t>)</a:t>
+            </a:r>
+            <a:endParaRPr lang="es-MX" dirty="0" smtClean="0"/>
+          </a:p>
+          <a:p>
+            <a:pPr algn="ctr"/>
+            <a:r>
+              <a:rPr lang="es-MX" dirty="0" smtClean="0"/>
+              <a:t>&lt;</a:t>
+            </a:r>
+            <a:r>
+              <a:rPr lang="es-MX" dirty="0" err="1" smtClean="0"/>
+              <a:t>Datos,Dir,final,W</a:t>
+            </a:r>
+            <a:r>
+              <a:rPr lang="es-MX" dirty="0" smtClean="0"/>
+              <a:t>=0&gt;</a:t>
             </a:r>
             <a:endParaRPr lang="es-ES" dirty="0"/>
           </a:p>
@@ -4623,9 +6059,9 @@
           <p:nvPr/>
         </p:nvCxnSpPr>
         <p:spPr>
-          <a:xfrm>
-            <a:off x="5203767" y="1429789"/>
-            <a:ext cx="8313" cy="556953"/>
+          <a:xfrm flipH="1">
+            <a:off x="5212082" y="1429789"/>
+            <a:ext cx="23296" cy="556953"/>
           </a:xfrm>
           <a:prstGeom prst="straightConnector1">
             <a:avLst/>
@@ -5724,8 +7160,8 @@
         </p:nvSpPr>
         <p:spPr>
           <a:xfrm>
-            <a:off x="2959331" y="548640"/>
-            <a:ext cx="2194560" cy="681644"/>
+            <a:off x="2285999" y="286790"/>
+            <a:ext cx="3501190" cy="943494"/>
           </a:xfrm>
           <a:prstGeom prst="ellipse">
             <a:avLst/>
@@ -5753,8 +7189,51 @@
           <a:p>
             <a:pPr algn="ctr"/>
             <a:r>
+              <a:rPr lang="es-MX" dirty="0" err="1" smtClean="0"/>
+              <a:t>While</a:t>
+            </a:r>
+            <a:endParaRPr lang="es-MX" dirty="0" smtClean="0"/>
+          </a:p>
+          <a:p>
+            <a:pPr algn="ctr"/>
+            <a:r>
               <a:rPr lang="es-MX" dirty="0" smtClean="0"/>
-              <a:t>inicio</a:t>
+              <a:t>(</a:t>
+            </a:r>
+            <a:r>
+              <a:rPr lang="es-MX" dirty="0" err="1" smtClean="0"/>
+              <a:t>inicio,fin</a:t>
+            </a:r>
+            <a:r>
+              <a:rPr lang="es-MX" dirty="0" smtClean="0"/>
+              <a:t>)</a:t>
+            </a:r>
+          </a:p>
+          <a:p>
+            <a:pPr algn="ctr"/>
+            <a:r>
+              <a:rPr lang="en-US" dirty="0"/>
+              <a:t>&lt;</a:t>
+            </a:r>
+            <a:r>
+              <a:rPr lang="es-MX" dirty="0" err="1" smtClean="0"/>
+              <a:t>Dato,ADD,R</a:t>
+            </a:r>
+            <a:r>
+              <a:rPr lang="es-MX" dirty="0" smtClean="0"/>
+              <a:t>/</a:t>
+            </a:r>
+            <a:r>
+              <a:rPr lang="es-MX" dirty="0" err="1" smtClean="0"/>
+              <a:t>w,fin</a:t>
+            </a:r>
+            <a:r>
+              <a:rPr lang="es-MX" dirty="0" smtClean="0"/>
+              <a:t> </a:t>
+            </a:r>
+            <a:r>
+              <a:rPr lang="es-MX" dirty="0" smtClean="0"/>
+              <a:t>&gt;</a:t>
             </a:r>
             <a:endParaRPr lang="es-ES" dirty="0"/>
           </a:p>
@@ -5855,8 +7334,8 @@
         </p:nvSpPr>
         <p:spPr>
           <a:xfrm>
-            <a:off x="856211" y="1471353"/>
-            <a:ext cx="1438102" cy="847898"/>
+            <a:off x="856211" y="1221973"/>
+            <a:ext cx="1438102" cy="1097278"/>
           </a:xfrm>
           <a:prstGeom prst="rect">
             <a:avLst/>
@@ -5900,6 +7379,14 @@
             <a:r>
               <a:rPr lang="es-MX" dirty="0" err="1" smtClean="0"/>
               <a:t>Dato:x</a:t>
+            </a:r>
+            <a:endParaRPr lang="es-MX" dirty="0" smtClean="0"/>
+          </a:p>
+          <a:p>
+            <a:pPr algn="ctr"/>
+            <a:r>
+              <a:rPr lang="es-MX" dirty="0" smtClean="0"/>
+              <a:t>R=0</a:t>
             </a:r>
             <a:endParaRPr lang="es-ES" dirty="0"/>
           </a:p>
@@ -6060,8 +7547,8 @@
         </p:nvCxnSpPr>
         <p:spPr>
           <a:xfrm>
-            <a:off x="4056611" y="1230284"/>
-            <a:ext cx="0" cy="332509"/>
+            <a:off x="4036594" y="1230284"/>
+            <a:ext cx="20017" cy="332509"/>
           </a:xfrm>
           <a:prstGeom prst="straightConnector1">
             <a:avLst/>
@@ -12898,7 +14385,7 @@
         <p:spPr>
           <a:xfrm>
             <a:off x="4439653" y="1143000"/>
-            <a:ext cx="1977977" cy="369332"/>
+            <a:ext cx="2111668" cy="369332"/>
           </a:xfrm>
           <a:prstGeom prst="rect">
             <a:avLst/>
@@ -12917,7 +14404,7 @@
             </a:r>
             <a:r>
               <a:rPr lang="es-ES" dirty="0" err="1" smtClean="0"/>
-              <a:t>ciclo,dato</a:t>
+              <a:t>ciclo,dato,r</a:t>
             </a:r>
             <a:r>
               <a:rPr lang="es-ES" dirty="0" smtClean="0"/>
@@ -12936,14 +14423,14 @@
           <p:nvPr>
             <p:extLst>
               <p:ext uri="{D42A27DB-BD31-4B8C-83A1-F6EECF244321}">
-                <p14:modId xmlns:p14="http://schemas.microsoft.com/office/powerpoint/2010/main" val="2544224840"/>
+                <p14:modId xmlns:p14="http://schemas.microsoft.com/office/powerpoint/2010/main" val="4053657715"/>
               </p:ext>
             </p:extLst>
           </p:nvPr>
         </p:nvGraphicFramePr>
         <p:xfrm>
           <a:off x="1707147" y="1995014"/>
-          <a:ext cx="8128002" cy="2595880"/>
+          <a:ext cx="8128001" cy="2595880"/>
         </p:xfrm>
         <a:graphic>
           <a:graphicData uri="http://schemas.openxmlformats.org/drawingml/2006/table">
@@ -12952,12 +14439,13 @@
                 <a:tableStyleId>{5C22544A-7EE6-4342-B048-85BDC9FD1C3A}</a:tableStyleId>
               </a:tblPr>
               <a:tblGrid>
-                <a:gridCol w="1354667"/>
-                <a:gridCol w="1354667"/>
-                <a:gridCol w="1354667"/>
-                <a:gridCol w="1354667"/>
-                <a:gridCol w="1354667"/>
-                <a:gridCol w="1354667"/>
+                <a:gridCol w="1161143"/>
+                <a:gridCol w="1161143"/>
+                <a:gridCol w="1161143"/>
+                <a:gridCol w="1161143"/>
+                <a:gridCol w="1161143"/>
+                <a:gridCol w="1161143"/>
+                <a:gridCol w="1161143"/>
               </a:tblGrid>
               <a:tr h="370840">
                 <a:tc>
@@ -13040,6 +14528,20 @@
                   </a:txBody>
                   <a:tcPr/>
                 </a:tc>
+                <a:tc>
+                  <a:txBody>
+                    <a:bodyPr/>
+                    <a:lstStyle/>
+                    <a:p>
+                      <a:r>
+                        <a:rPr lang="es-ES" dirty="0" smtClean="0"/>
+                        <a:t>R1</a:t>
+                      </a:r>
+                      <a:endParaRPr lang="es-ES" dirty="0"/>
+                    </a:p>
+                  </a:txBody>
+                  <a:tcPr/>
+                </a:tc>
               </a:tr>
               <a:tr h="370840">
                 <a:tc>
@@ -13126,6 +14628,20 @@
                   </a:txBody>
                   <a:tcPr/>
                 </a:tc>
+                <a:tc>
+                  <a:txBody>
+                    <a:bodyPr/>
+                    <a:lstStyle/>
+                    <a:p>
+                      <a:r>
+                        <a:rPr lang="es-ES" dirty="0" smtClean="0"/>
+                        <a:t>0</a:t>
+                      </a:r>
+                      <a:endParaRPr lang="es-ES" dirty="0"/>
+                    </a:p>
+                  </a:txBody>
+                  <a:tcPr/>
+                </a:tc>
               </a:tr>
               <a:tr h="370840">
                 <a:tc>
@@ -13212,6 +14728,20 @@
                   </a:txBody>
                   <a:tcPr/>
                 </a:tc>
+                <a:tc>
+                  <a:txBody>
+                    <a:bodyPr/>
+                    <a:lstStyle/>
+                    <a:p>
+                      <a:r>
+                        <a:rPr lang="es-ES" dirty="0" smtClean="0"/>
+                        <a:t>0</a:t>
+                      </a:r>
+                      <a:endParaRPr lang="es-ES" dirty="0"/>
+                    </a:p>
+                  </a:txBody>
+                  <a:tcPr/>
+                </a:tc>
               </a:tr>
               <a:tr h="370840">
                 <a:tc>
@@ -13298,6 +14828,20 @@
                   </a:txBody>
                   <a:tcPr/>
                 </a:tc>
+                <a:tc>
+                  <a:txBody>
+                    <a:bodyPr/>
+                    <a:lstStyle/>
+                    <a:p>
+                      <a:r>
+                        <a:rPr lang="es-ES" dirty="0" smtClean="0"/>
+                        <a:t>R</a:t>
+                      </a:r>
+                      <a:endParaRPr lang="es-ES" dirty="0"/>
+                    </a:p>
+                  </a:txBody>
+                  <a:tcPr/>
+                </a:tc>
               </a:tr>
               <a:tr h="370840">
                 <a:tc>
@@ -13384,6 +14928,20 @@
                   </a:txBody>
                   <a:tcPr/>
                 </a:tc>
+                <a:tc>
+                  <a:txBody>
+                    <a:bodyPr/>
+                    <a:lstStyle/>
+                    <a:p>
+                      <a:r>
+                        <a:rPr lang="es-ES" dirty="0" smtClean="0"/>
+                        <a:t>R</a:t>
+                      </a:r>
+                      <a:endParaRPr lang="es-ES" dirty="0"/>
+                    </a:p>
+                  </a:txBody>
+                  <a:tcPr/>
+                </a:tc>
               </a:tr>
               <a:tr h="370840">
                 <a:tc>
@@ -13470,6 +15028,20 @@
                   </a:txBody>
                   <a:tcPr/>
                 </a:tc>
+                <a:tc>
+                  <a:txBody>
+                    <a:bodyPr/>
+                    <a:lstStyle/>
+                    <a:p>
+                      <a:r>
+                        <a:rPr lang="es-ES" dirty="0" smtClean="0"/>
+                        <a:t>R</a:t>
+                      </a:r>
+                      <a:endParaRPr lang="es-ES" dirty="0"/>
+                    </a:p>
+                  </a:txBody>
+                  <a:tcPr/>
+                </a:tc>
               </a:tr>
               <a:tr h="370840">
                 <a:tc>
@@ -13536,6 +15108,20 @@
                       <a:r>
                         <a:rPr lang="es-ES" dirty="0" smtClean="0"/>
                         <a:t>ciclo</a:t>
+                      </a:r>
+                      <a:endParaRPr lang="es-ES" dirty="0"/>
+                    </a:p>
+                  </a:txBody>
+                  <a:tcPr/>
+                </a:tc>
+                <a:tc>
+                  <a:txBody>
+                    <a:bodyPr/>
+                    <a:lstStyle/>
+                    <a:p>
+                      <a:r>
+                        <a:rPr lang="es-ES" dirty="0" smtClean="0"/>
+                        <a:t>0</a:t>
                       </a:r>
                       <a:endParaRPr lang="es-ES" dirty="0"/>
                     </a:p>
@@ -13639,8 +15225,12 @@
               <a:t>(dato, </a:t>
             </a:r>
             <a:r>
+              <a:rPr lang="es-MX" dirty="0" err="1" smtClean="0"/>
+              <a:t>Add,R</a:t>
+            </a:r>
+            <a:r>
               <a:rPr lang="es-MX" dirty="0" smtClean="0"/>
-              <a:t>Add)</a:t>
+              <a:t>)</a:t>
             </a:r>
           </a:p>
           <a:p>
@@ -13651,7 +15241,7 @@
             </a:r>
             <a:r>
               <a:rPr lang="es-MX" dirty="0" err="1" smtClean="0"/>
-              <a:t>ciclo,salida</a:t>
+              <a:t>ciclo,salida,fin</a:t>
             </a:r>
             <a:r>
               <a:rPr lang="es-MX" dirty="0" smtClean="0"/>
@@ -13830,6 +15420,13 @@
               <a:rPr lang="es-MX" dirty="0" smtClean="0"/>
               <a:t>salida=Add</a:t>
             </a:r>
+          </a:p>
+          <a:p>
+            <a:pPr algn="ctr"/>
+            <a:r>
+              <a:rPr lang="es-MX" dirty="0" smtClean="0"/>
+              <a:t>R=0</a:t>
+            </a:r>
             <a:endParaRPr lang="es-MX" dirty="0" smtClean="0"/>
           </a:p>
           <a:p>
@@ -13971,6 +15568,13 @@
             <a:r>
               <a:rPr lang="es-MX" dirty="0" smtClean="0"/>
               <a:t>salida=dato</a:t>
+            </a:r>
+          </a:p>
+          <a:p>
+            <a:pPr algn="ctr"/>
+            <a:r>
+              <a:rPr lang="es-MX" dirty="0" smtClean="0"/>
+              <a:t>R=1</a:t>
             </a:r>
             <a:endParaRPr lang="es-MX" dirty="0" smtClean="0"/>
           </a:p>
@@ -16867,7 +18471,7 @@
         <p:spPr>
           <a:xfrm>
             <a:off x="4439653" y="1143000"/>
-            <a:ext cx="1977977" cy="369332"/>
+            <a:ext cx="2196627" cy="369332"/>
           </a:xfrm>
           <a:prstGeom prst="rect">
             <a:avLst/>
@@ -16886,7 +18490,7 @@
             </a:r>
             <a:r>
               <a:rPr lang="es-ES" dirty="0" err="1" smtClean="0"/>
-              <a:t>ciclo,dato</a:t>
+              <a:t>ciclo,dato,w</a:t>
             </a:r>
             <a:r>
               <a:rPr lang="es-ES" dirty="0" smtClean="0"/>
@@ -16902,11 +18506,17 @@
           <p:cNvGraphicFramePr>
             <a:graphicFrameLocks noGrp="1"/>
           </p:cNvGraphicFramePr>
-          <p:nvPr/>
+          <p:nvPr>
+            <p:extLst>
+              <p:ext uri="{D42A27DB-BD31-4B8C-83A1-F6EECF244321}">
+                <p14:modId xmlns:p14="http://schemas.microsoft.com/office/powerpoint/2010/main" val="1117912762"/>
+              </p:ext>
+            </p:extLst>
+          </p:nvPr>
         </p:nvGraphicFramePr>
         <p:xfrm>
           <a:off x="1707147" y="1995014"/>
-          <a:ext cx="8128002" cy="2595880"/>
+          <a:ext cx="8128001" cy="2595880"/>
         </p:xfrm>
         <a:graphic>
           <a:graphicData uri="http://schemas.openxmlformats.org/drawingml/2006/table">
@@ -16915,12 +18525,13 @@
                 <a:tableStyleId>{5C22544A-7EE6-4342-B048-85BDC9FD1C3A}</a:tableStyleId>
               </a:tblPr>
               <a:tblGrid>
-                <a:gridCol w="1354667"/>
-                <a:gridCol w="1354667"/>
-                <a:gridCol w="1354667"/>
-                <a:gridCol w="1354667"/>
-                <a:gridCol w="1354667"/>
-                <a:gridCol w="1354667"/>
+                <a:gridCol w="1161143"/>
+                <a:gridCol w="1161143"/>
+                <a:gridCol w="1161143"/>
+                <a:gridCol w="1161143"/>
+                <a:gridCol w="1161143"/>
+                <a:gridCol w="1161143"/>
+                <a:gridCol w="1161143"/>
               </a:tblGrid>
               <a:tr h="370840">
                 <a:tc>
@@ -17003,6 +18614,20 @@
                   </a:txBody>
                   <a:tcPr/>
                 </a:tc>
+                <a:tc>
+                  <a:txBody>
+                    <a:bodyPr/>
+                    <a:lstStyle/>
+                    <a:p>
+                      <a:r>
+                        <a:rPr lang="es-ES" dirty="0" smtClean="0"/>
+                        <a:t>W1</a:t>
+                      </a:r>
+                      <a:endParaRPr lang="es-ES" dirty="0"/>
+                    </a:p>
+                  </a:txBody>
+                  <a:tcPr/>
+                </a:tc>
               </a:tr>
               <a:tr h="370840">
                 <a:tc>
@@ -17089,6 +18714,20 @@
                   </a:txBody>
                   <a:tcPr/>
                 </a:tc>
+                <a:tc>
+                  <a:txBody>
+                    <a:bodyPr/>
+                    <a:lstStyle/>
+                    <a:p>
+                      <a:r>
+                        <a:rPr lang="es-ES" dirty="0" smtClean="0"/>
+                        <a:t>0</a:t>
+                      </a:r>
+                      <a:endParaRPr lang="es-ES" dirty="0"/>
+                    </a:p>
+                  </a:txBody>
+                  <a:tcPr/>
+                </a:tc>
               </a:tr>
               <a:tr h="370840">
                 <a:tc>
@@ -17175,6 +18814,20 @@
                   </a:txBody>
                   <a:tcPr/>
                 </a:tc>
+                <a:tc>
+                  <a:txBody>
+                    <a:bodyPr/>
+                    <a:lstStyle/>
+                    <a:p>
+                      <a:r>
+                        <a:rPr lang="es-ES" dirty="0" smtClean="0"/>
+                        <a:t>0</a:t>
+                      </a:r>
+                      <a:endParaRPr lang="es-ES" dirty="0"/>
+                    </a:p>
+                  </a:txBody>
+                  <a:tcPr/>
+                </a:tc>
               </a:tr>
               <a:tr h="370840">
                 <a:tc>
@@ -17261,6 +18914,20 @@
                   </a:txBody>
                   <a:tcPr/>
                 </a:tc>
+                <a:tc>
+                  <a:txBody>
+                    <a:bodyPr/>
+                    <a:lstStyle/>
+                    <a:p>
+                      <a:r>
+                        <a:rPr lang="es-ES" dirty="0" smtClean="0"/>
+                        <a:t>W</a:t>
+                      </a:r>
+                      <a:endParaRPr lang="es-ES" dirty="0"/>
+                    </a:p>
+                  </a:txBody>
+                  <a:tcPr/>
+                </a:tc>
               </a:tr>
               <a:tr h="370840">
                 <a:tc>
@@ -17347,6 +19014,20 @@
                   </a:txBody>
                   <a:tcPr/>
                 </a:tc>
+                <a:tc>
+                  <a:txBody>
+                    <a:bodyPr/>
+                    <a:lstStyle/>
+                    <a:p>
+                      <a:r>
+                        <a:rPr lang="es-ES" dirty="0" smtClean="0"/>
+                        <a:t>W</a:t>
+                      </a:r>
+                      <a:endParaRPr lang="es-ES" dirty="0"/>
+                    </a:p>
+                  </a:txBody>
+                  <a:tcPr/>
+                </a:tc>
               </a:tr>
               <a:tr h="370840">
                 <a:tc>
@@ -17433,6 +19114,20 @@
                   </a:txBody>
                   <a:tcPr/>
                 </a:tc>
+                <a:tc>
+                  <a:txBody>
+                    <a:bodyPr/>
+                    <a:lstStyle/>
+                    <a:p>
+                      <a:r>
+                        <a:rPr lang="es-ES" dirty="0" smtClean="0"/>
+                        <a:t>w</a:t>
+                      </a:r>
+                      <a:endParaRPr lang="es-ES" dirty="0"/>
+                    </a:p>
+                  </a:txBody>
+                  <a:tcPr/>
+                </a:tc>
               </a:tr>
               <a:tr h="370840">
                 <a:tc>
@@ -17499,6 +19194,20 @@
                       <a:r>
                         <a:rPr lang="es-ES" dirty="0" smtClean="0"/>
                         <a:t>ciclo</a:t>
+                      </a:r>
+                      <a:endParaRPr lang="es-ES" dirty="0"/>
+                    </a:p>
+                  </a:txBody>
+                  <a:tcPr/>
+                </a:tc>
+                <a:tc>
+                  <a:txBody>
+                    <a:bodyPr/>
+                    <a:lstStyle/>
+                    <a:p>
+                      <a:r>
+                        <a:rPr lang="es-ES" dirty="0" smtClean="0"/>
+                        <a:t>0</a:t>
                       </a:r>
                       <a:endParaRPr lang="es-ES" dirty="0"/>
                     </a:p>

</xml_diff>

<commit_message>
subi los fsm del RTC
</commit_message>
<xml_diff>
--- a/Designs/Presentación1.pptx
+++ b/Designs/Presentación1.pptx
@@ -253,7 +253,7 @@
           <a:p>
             <a:fld id="{E35788EC-455E-44C4-9D66-6A4281A04F8D}" type="datetimeFigureOut">
               <a:rPr lang="es-ES" smtClean="0"/>
-              <a:t>10/09/2016</a:t>
+              <a:t>13/09/2016</a:t>
             </a:fld>
             <a:endParaRPr lang="es-ES"/>
           </a:p>
@@ -423,7 +423,7 @@
           <a:p>
             <a:fld id="{E35788EC-455E-44C4-9D66-6A4281A04F8D}" type="datetimeFigureOut">
               <a:rPr lang="es-ES" smtClean="0"/>
-              <a:t>10/09/2016</a:t>
+              <a:t>13/09/2016</a:t>
             </a:fld>
             <a:endParaRPr lang="es-ES"/>
           </a:p>
@@ -603,7 +603,7 @@
           <a:p>
             <a:fld id="{E35788EC-455E-44C4-9D66-6A4281A04F8D}" type="datetimeFigureOut">
               <a:rPr lang="es-ES" smtClean="0"/>
-              <a:t>10/09/2016</a:t>
+              <a:t>13/09/2016</a:t>
             </a:fld>
             <a:endParaRPr lang="es-ES"/>
           </a:p>
@@ -773,7 +773,7 @@
           <a:p>
             <a:fld id="{E35788EC-455E-44C4-9D66-6A4281A04F8D}" type="datetimeFigureOut">
               <a:rPr lang="es-ES" smtClean="0"/>
-              <a:t>10/09/2016</a:t>
+              <a:t>13/09/2016</a:t>
             </a:fld>
             <a:endParaRPr lang="es-ES"/>
           </a:p>
@@ -1019,7 +1019,7 @@
           <a:p>
             <a:fld id="{E35788EC-455E-44C4-9D66-6A4281A04F8D}" type="datetimeFigureOut">
               <a:rPr lang="es-ES" smtClean="0"/>
-              <a:t>10/09/2016</a:t>
+              <a:t>13/09/2016</a:t>
             </a:fld>
             <a:endParaRPr lang="es-ES"/>
           </a:p>
@@ -1251,7 +1251,7 @@
           <a:p>
             <a:fld id="{E35788EC-455E-44C4-9D66-6A4281A04F8D}" type="datetimeFigureOut">
               <a:rPr lang="es-ES" smtClean="0"/>
-              <a:t>10/09/2016</a:t>
+              <a:t>13/09/2016</a:t>
             </a:fld>
             <a:endParaRPr lang="es-ES"/>
           </a:p>
@@ -1618,7 +1618,7 @@
           <a:p>
             <a:fld id="{E35788EC-455E-44C4-9D66-6A4281A04F8D}" type="datetimeFigureOut">
               <a:rPr lang="es-ES" smtClean="0"/>
-              <a:t>10/09/2016</a:t>
+              <a:t>13/09/2016</a:t>
             </a:fld>
             <a:endParaRPr lang="es-ES"/>
           </a:p>
@@ -1736,7 +1736,7 @@
           <a:p>
             <a:fld id="{E35788EC-455E-44C4-9D66-6A4281A04F8D}" type="datetimeFigureOut">
               <a:rPr lang="es-ES" smtClean="0"/>
-              <a:t>10/09/2016</a:t>
+              <a:t>13/09/2016</a:t>
             </a:fld>
             <a:endParaRPr lang="es-ES"/>
           </a:p>
@@ -1831,7 +1831,7 @@
           <a:p>
             <a:fld id="{E35788EC-455E-44C4-9D66-6A4281A04F8D}" type="datetimeFigureOut">
               <a:rPr lang="es-ES" smtClean="0"/>
-              <a:t>10/09/2016</a:t>
+              <a:t>13/09/2016</a:t>
             </a:fld>
             <a:endParaRPr lang="es-ES"/>
           </a:p>
@@ -2108,7 +2108,7 @@
           <a:p>
             <a:fld id="{E35788EC-455E-44C4-9D66-6A4281A04F8D}" type="datetimeFigureOut">
               <a:rPr lang="es-ES" smtClean="0"/>
-              <a:t>10/09/2016</a:t>
+              <a:t>13/09/2016</a:t>
             </a:fld>
             <a:endParaRPr lang="es-ES"/>
           </a:p>
@@ -2361,7 +2361,7 @@
           <a:p>
             <a:fld id="{E35788EC-455E-44C4-9D66-6A4281A04F8D}" type="datetimeFigureOut">
               <a:rPr lang="es-ES" smtClean="0"/>
-              <a:t>10/09/2016</a:t>
+              <a:t>13/09/2016</a:t>
             </a:fld>
             <a:endParaRPr lang="es-ES"/>
           </a:p>
@@ -2574,7 +2574,7 @@
           <a:p>
             <a:fld id="{E35788EC-455E-44C4-9D66-6A4281A04F8D}" type="datetimeFigureOut">
               <a:rPr lang="es-ES" smtClean="0"/>
-              <a:t>10/09/2016</a:t>
+              <a:t>13/09/2016</a:t>
             </a:fld>
             <a:endParaRPr lang="es-ES"/>
           </a:p>
@@ -7610,7 +7610,7 @@
         </p:nvSpPr>
         <p:spPr>
           <a:xfrm>
-            <a:off x="2959330" y="4646814"/>
+            <a:off x="2939314" y="4821382"/>
             <a:ext cx="2194560" cy="706582"/>
           </a:xfrm>
           <a:prstGeom prst="ellipse">
@@ -7656,7 +7656,7 @@
         </p:nvCxnSpPr>
         <p:spPr>
           <a:xfrm flipH="1">
-            <a:off x="2285999" y="5000105"/>
+            <a:off x="2265983" y="5174673"/>
             <a:ext cx="673331" cy="0"/>
           </a:xfrm>
           <a:prstGeom prst="straightConnector1">
@@ -7757,8 +7757,8 @@
         </p:nvCxnSpPr>
         <p:spPr>
           <a:xfrm flipH="1">
-            <a:off x="4056610" y="3749040"/>
-            <a:ext cx="1" cy="897774"/>
+            <a:off x="4036594" y="3749040"/>
+            <a:ext cx="20017" cy="1072342"/>
           </a:xfrm>
           <a:prstGeom prst="straightConnector1">
             <a:avLst/>
@@ -8466,8 +8466,8 @@
         </p:nvCxnSpPr>
         <p:spPr>
           <a:xfrm rot="16200000" flipH="1">
-            <a:off x="4495367" y="4914639"/>
-            <a:ext cx="965833" cy="1843346"/>
+            <a:off x="4572643" y="4991915"/>
+            <a:ext cx="791265" cy="1863362"/>
           </a:xfrm>
           <a:prstGeom prst="bentConnector2">
             <a:avLst/>

</xml_diff>